<commit_message>
Website altered - DB Backend introduced
</commit_message>
<xml_diff>
--- a/Final PPT.pptx
+++ b/Final PPT.pptx
@@ -195,7 +195,7 @@
           <a:p>
             <a:fld id="{CCF9D582-2860-476A-900F-9DDE2D094A39}" type="datetimeFigureOut">
               <a:rPr lang="en-US" smtClean="0"/>
-              <a:t>7/15/2014</a:t>
+              <a:t>7/20/2014</a:t>
             </a:fld>
             <a:endParaRPr lang="en-US"/>
           </a:p>
@@ -397,7 +397,7 @@
           <a:p>
             <a:fld id="{47CC9394-D802-4D72-8B8E-A1F66F4D3DA0}" type="datetimeFigureOut">
               <a:rPr lang="en-US" smtClean="0"/>
-              <a:t>7/15/2014</a:t>
+              <a:t>7/20/2014</a:t>
             </a:fld>
             <a:endParaRPr lang="en-US"/>
           </a:p>
@@ -884,7 +884,7 @@
           <a:p>
             <a:fld id="{1BFF5ED7-E4D6-4F88-9CA5-18A3B5B56D99}" type="datetimeFigureOut">
               <a:rPr lang="en-US" smtClean="0"/>
-              <a:t>7/15/2014</a:t>
+              <a:t>7/20/2014</a:t>
             </a:fld>
             <a:endParaRPr lang="en-US"/>
           </a:p>
@@ -1092,7 +1092,7 @@
           <a:p>
             <a:fld id="{1BFF5ED7-E4D6-4F88-9CA5-18A3B5B56D99}" type="datetimeFigureOut">
               <a:rPr lang="en-US" smtClean="0"/>
-              <a:t>7/15/2014</a:t>
+              <a:t>7/20/2014</a:t>
             </a:fld>
             <a:endParaRPr lang="en-US"/>
           </a:p>
@@ -1272,7 +1272,7 @@
           <a:p>
             <a:fld id="{1BFF5ED7-E4D6-4F88-9CA5-18A3B5B56D99}" type="datetimeFigureOut">
               <a:rPr lang="en-US" smtClean="0"/>
-              <a:t>7/15/2014</a:t>
+              <a:t>7/20/2014</a:t>
             </a:fld>
             <a:endParaRPr lang="en-US"/>
           </a:p>
@@ -1442,7 +1442,7 @@
           <a:p>
             <a:fld id="{1BFF5ED7-E4D6-4F88-9CA5-18A3B5B56D99}" type="datetimeFigureOut">
               <a:rPr lang="en-US" smtClean="0"/>
-              <a:t>7/15/2014</a:t>
+              <a:t>7/20/2014</a:t>
             </a:fld>
             <a:endParaRPr lang="en-US"/>
           </a:p>
@@ -1688,7 +1688,7 @@
           <a:p>
             <a:fld id="{1BFF5ED7-E4D6-4F88-9CA5-18A3B5B56D99}" type="datetimeFigureOut">
               <a:rPr lang="en-US" smtClean="0"/>
-              <a:t>7/15/2014</a:t>
+              <a:t>7/20/2014</a:t>
             </a:fld>
             <a:endParaRPr lang="en-US"/>
           </a:p>
@@ -1976,7 +1976,7 @@
           <a:p>
             <a:fld id="{1BFF5ED7-E4D6-4F88-9CA5-18A3B5B56D99}" type="datetimeFigureOut">
               <a:rPr lang="en-US" smtClean="0"/>
-              <a:t>7/15/2014</a:t>
+              <a:t>7/20/2014</a:t>
             </a:fld>
             <a:endParaRPr lang="en-US"/>
           </a:p>
@@ -2398,7 +2398,7 @@
           <a:p>
             <a:fld id="{1BFF5ED7-E4D6-4F88-9CA5-18A3B5B56D99}" type="datetimeFigureOut">
               <a:rPr lang="en-US" smtClean="0"/>
-              <a:t>7/15/2014</a:t>
+              <a:t>7/20/2014</a:t>
             </a:fld>
             <a:endParaRPr lang="en-US"/>
           </a:p>
@@ -2516,7 +2516,7 @@
           <a:p>
             <a:fld id="{1BFF5ED7-E4D6-4F88-9CA5-18A3B5B56D99}" type="datetimeFigureOut">
               <a:rPr lang="en-US" smtClean="0"/>
-              <a:t>7/15/2014</a:t>
+              <a:t>7/20/2014</a:t>
             </a:fld>
             <a:endParaRPr lang="en-US"/>
           </a:p>
@@ -2611,7 +2611,7 @@
           <a:p>
             <a:fld id="{1BFF5ED7-E4D6-4F88-9CA5-18A3B5B56D99}" type="datetimeFigureOut">
               <a:rPr lang="en-US" smtClean="0"/>
-              <a:t>7/15/2014</a:t>
+              <a:t>7/20/2014</a:t>
             </a:fld>
             <a:endParaRPr lang="en-US"/>
           </a:p>
@@ -2888,7 +2888,7 @@
           <a:p>
             <a:fld id="{1BFF5ED7-E4D6-4F88-9CA5-18A3B5B56D99}" type="datetimeFigureOut">
               <a:rPr lang="en-US" smtClean="0"/>
-              <a:t>7/15/2014</a:t>
+              <a:t>7/20/2014</a:t>
             </a:fld>
             <a:endParaRPr lang="en-US"/>
           </a:p>
@@ -3141,7 +3141,7 @@
           <a:p>
             <a:fld id="{1BFF5ED7-E4D6-4F88-9CA5-18A3B5B56D99}" type="datetimeFigureOut">
               <a:rPr lang="en-US" smtClean="0"/>
-              <a:t>7/15/2014</a:t>
+              <a:t>7/20/2014</a:t>
             </a:fld>
             <a:endParaRPr lang="en-US"/>
           </a:p>
@@ -3354,7 +3354,7 @@
           <a:p>
             <a:fld id="{1BFF5ED7-E4D6-4F88-9CA5-18A3B5B56D99}" type="datetimeFigureOut">
               <a:rPr lang="en-US" smtClean="0"/>
-              <a:t>7/15/2014</a:t>
+              <a:t>7/20/2014</a:t>
             </a:fld>
             <a:endParaRPr lang="en-US"/>
           </a:p>
@@ -3915,7 +3915,6 @@
               <a:rPr lang="en-US" dirty="0" smtClean="0"/>
               <a:t>MVC Design Pattern</a:t>
             </a:r>
-            <a:endParaRPr lang="en-US" dirty="0" smtClean="0"/>
           </a:p>
         </p:txBody>
       </p:sp>
@@ -4023,7 +4022,7 @@
         <p:spPr>
           <a:xfrm>
             <a:off x="172632" y="2895601"/>
-            <a:ext cx="8750120" cy="1752599"/>
+            <a:ext cx="8750120" cy="1600199"/>
           </a:xfrm>
           <a:prstGeom prst="rect">
             <a:avLst/>
@@ -4083,8 +4082,8 @@
         </p:nvSpPr>
         <p:spPr>
           <a:xfrm>
-            <a:off x="184006" y="4724400"/>
-            <a:ext cx="8750120" cy="1752599"/>
+            <a:off x="184006" y="4572000"/>
+            <a:ext cx="8750120" cy="1600201"/>
           </a:xfrm>
           <a:prstGeom prst="rect">
             <a:avLst/>
@@ -4144,8 +4143,8 @@
         </p:nvSpPr>
         <p:spPr>
           <a:xfrm>
-            <a:off x="274632" y="3124200"/>
-            <a:ext cx="8581892" cy="369332"/>
+            <a:off x="308751" y="3095767"/>
+            <a:ext cx="8581892" cy="923330"/>
           </a:xfrm>
           <a:prstGeom prst="rect">
             <a:avLst/>
@@ -4160,7 +4159,24 @@
           <a:p>
             <a:r>
               <a:rPr lang="en-US" dirty="0" smtClean="0"/>
-              <a:t>So Far - </a:t>
+              <a:t>Build upon </a:t>
+            </a:r>
+            <a:r>
+              <a:rPr lang="en-US" dirty="0" err="1" smtClean="0"/>
+              <a:t>TextBlob</a:t>
+            </a:r>
+            <a:r>
+              <a:rPr lang="en-US" dirty="0" smtClean="0"/>
+              <a:t> – Custom tokenizer, dell-specific dictionary</a:t>
+            </a:r>
+          </a:p>
+          <a:p>
+            <a:endParaRPr lang="en-US" dirty="0" smtClean="0"/>
+          </a:p>
+          <a:p>
+            <a:r>
+              <a:rPr lang="en-US" dirty="0" smtClean="0"/>
+              <a:t> </a:t>
             </a:r>
             <a:endParaRPr lang="en-US" dirty="0"/>
           </a:p>

</xml_diff>